<commit_message>
Add indirect, coupling feedback
</commit_message>
<xml_diff>
--- a/JournalPaper/DPD BLock Diagram SIPS.pptx
+++ b/JournalPaper/DPD BLock Diagram SIPS.pptx
@@ -104,6 +104,11 @@
       </a:defRPr>
     </a:lvl9pPr>
   </p:defaultTextStyle>
+  <p:extLst>
+    <p:ext uri="{EFAFB233-063F-42B5-8137-9DF3F51BA10A}">
+      <p15:sldGuideLst xmlns:p15="http://schemas.microsoft.com/office/powerpoint/2012/main"/>
+    </p:ext>
+  </p:extLst>
 </p:presentation>
 </file>
 
@@ -4031,42 +4036,6 @@
       </p:sp>
       <p:cxnSp>
         <p:nvCxnSpPr>
-          <p:cNvPr id="52" name="Elbow Connector 51"/>
-          <p:cNvCxnSpPr>
-            <a:stCxn id="27" idx="0"/>
-            <a:endCxn id="50" idx="0"/>
-          </p:cNvCxnSpPr>
-          <p:nvPr/>
-        </p:nvCxnSpPr>
-        <p:spPr>
-          <a:xfrm>
-            <a:off x="5687457" y="1123245"/>
-            <a:ext cx="415160" cy="1236840"/>
-          </a:xfrm>
-          <a:prstGeom prst="bentConnector2">
-            <a:avLst/>
-          </a:prstGeom>
-          <a:ln>
-            <a:tailEnd type="triangle"/>
-          </a:ln>
-        </p:spPr>
-        <p:style>
-          <a:lnRef idx="1">
-            <a:schemeClr val="dk1"/>
-          </a:lnRef>
-          <a:fillRef idx="0">
-            <a:schemeClr val="dk1"/>
-          </a:fillRef>
-          <a:effectRef idx="0">
-            <a:schemeClr val="dk1"/>
-          </a:effectRef>
-          <a:fontRef idx="minor">
-            <a:schemeClr val="tx1"/>
-          </a:fontRef>
-        </p:style>
-      </p:cxnSp>
-      <p:cxnSp>
-        <p:nvCxnSpPr>
           <p:cNvPr id="57" name="Elbow Connector 56"/>
           <p:cNvCxnSpPr>
             <a:stCxn id="50" idx="4"/>
@@ -4279,126 +4248,6 @@
           <a:ln>
             <a:tailEnd type="triangle"/>
           </a:ln>
-        </p:spPr>
-        <p:style>
-          <a:lnRef idx="1">
-            <a:schemeClr val="dk1"/>
-          </a:lnRef>
-          <a:fillRef idx="0">
-            <a:schemeClr val="dk1"/>
-          </a:fillRef>
-          <a:effectRef idx="0">
-            <a:schemeClr val="dk1"/>
-          </a:effectRef>
-          <a:fontRef idx="minor">
-            <a:schemeClr val="tx1"/>
-          </a:fontRef>
-        </p:style>
-      </p:cxnSp>
-      <p:cxnSp>
-        <p:nvCxnSpPr>
-          <p:cNvPr id="78" name="Straight Arrow Connector 77"/>
-          <p:cNvCxnSpPr/>
-          <p:nvPr/>
-        </p:nvCxnSpPr>
-        <p:spPr>
-          <a:xfrm flipV="1">
-            <a:off x="3203397" y="2968366"/>
-            <a:ext cx="187199" cy="416732"/>
-          </a:xfrm>
-          <a:prstGeom prst="straightConnector1">
-            <a:avLst/>
-          </a:prstGeom>
-          <a:ln>
-            <a:tailEnd type="triangle"/>
-          </a:ln>
-        </p:spPr>
-        <p:style>
-          <a:lnRef idx="1">
-            <a:schemeClr val="dk1"/>
-          </a:lnRef>
-          <a:fillRef idx="0">
-            <a:schemeClr val="dk1"/>
-          </a:fillRef>
-          <a:effectRef idx="0">
-            <a:schemeClr val="dk1"/>
-          </a:effectRef>
-          <a:fontRef idx="minor">
-            <a:schemeClr val="tx1"/>
-          </a:fontRef>
-        </p:style>
-      </p:cxnSp>
-      <p:sp>
-        <p:nvSpPr>
-          <p:cNvPr id="72" name="Isosceles Triangle 71"/>
-          <p:cNvSpPr/>
-          <p:nvPr/>
-        </p:nvSpPr>
-        <p:spPr>
-          <a:xfrm rot="5400000">
-            <a:off x="3010126" y="2906511"/>
-            <a:ext cx="457200" cy="523835"/>
-          </a:xfrm>
-          <a:prstGeom prst="triangle">
-            <a:avLst/>
-          </a:prstGeom>
-        </p:spPr>
-        <p:style>
-          <a:lnRef idx="2">
-            <a:schemeClr val="dk1"/>
-          </a:lnRef>
-          <a:fillRef idx="1">
-            <a:schemeClr val="lt1"/>
-          </a:fillRef>
-          <a:effectRef idx="0">
-            <a:schemeClr val="dk1"/>
-          </a:effectRef>
-          <a:fontRef idx="minor">
-            <a:schemeClr val="dk1"/>
-          </a:fontRef>
-        </p:style>
-        <p:txBody>
-          <a:bodyPr vert="vert270" rtlCol="0" anchor="ctr"/>
-          <a:lstStyle/>
-          <a:p>
-            <a:pPr algn="ctr"/>
-            <a:r>
-              <a:rPr lang="en-US" sz="900" dirty="0" smtClean="0">
-                <a:latin typeface="Times New Roman" panose="02020603050405020304" pitchFamily="18" charset="0"/>
-                <a:cs typeface="Times New Roman" panose="02020603050405020304" pitchFamily="18" charset="0"/>
-              </a:rPr>
-              <a:t>α</a:t>
-            </a:r>
-            <a:r>
-              <a:rPr lang="en-US" sz="900" baseline="-25000" dirty="0" err="1" smtClean="0">
-                <a:latin typeface="Times New Roman" panose="02020603050405020304" pitchFamily="18" charset="0"/>
-                <a:cs typeface="Times New Roman" panose="02020603050405020304" pitchFamily="18" charset="0"/>
-              </a:rPr>
-              <a:t>j,m</a:t>
-            </a:r>
-            <a:endParaRPr lang="en-US" sz="900" baseline="-25000" dirty="0">
-              <a:latin typeface="Times New Roman" panose="02020603050405020304" pitchFamily="18" charset="0"/>
-              <a:cs typeface="Times New Roman" panose="02020603050405020304" pitchFamily="18" charset="0"/>
-            </a:endParaRPr>
-          </a:p>
-        </p:txBody>
-      </p:sp>
-      <p:cxnSp>
-        <p:nvCxnSpPr>
-          <p:cNvPr id="76" name="Straight Connector 75"/>
-          <p:cNvCxnSpPr>
-            <a:stCxn id="61" idx="0"/>
-          </p:cNvCxnSpPr>
-          <p:nvPr/>
-        </p:nvCxnSpPr>
-        <p:spPr>
-          <a:xfrm flipH="1" flipV="1">
-            <a:off x="3203397" y="3384120"/>
-            <a:ext cx="2034" cy="229950"/>
-          </a:xfrm>
-          <a:prstGeom prst="line">
-            <a:avLst/>
-          </a:prstGeom>
         </p:spPr>
         <p:style>
           <a:lnRef idx="1">
@@ -5289,6 +5138,418 @@
           </a:fontRef>
         </p:style>
       </p:cxnSp>
+      <p:sp>
+        <p:nvSpPr>
+          <p:cNvPr id="2" name="Isosceles Triangle 1"/>
+          <p:cNvSpPr/>
+          <p:nvPr/>
+        </p:nvSpPr>
+        <p:spPr>
+          <a:xfrm rot="10800000">
+            <a:off x="6227584" y="340188"/>
+            <a:ext cx="237744" cy="228600"/>
+          </a:xfrm>
+          <a:prstGeom prst="triangle">
+            <a:avLst/>
+          </a:prstGeom>
+        </p:spPr>
+        <p:style>
+          <a:lnRef idx="2">
+            <a:schemeClr val="dk1"/>
+          </a:lnRef>
+          <a:fillRef idx="1">
+            <a:schemeClr val="lt1"/>
+          </a:fillRef>
+          <a:effectRef idx="0">
+            <a:schemeClr val="dk1"/>
+          </a:effectRef>
+          <a:fontRef idx="minor">
+            <a:schemeClr val="dk1"/>
+          </a:fontRef>
+        </p:style>
+        <p:txBody>
+          <a:bodyPr rtlCol="0" anchor="ctr"/>
+          <a:lstStyle/>
+          <a:p>
+            <a:pPr algn="ctr"/>
+            <a:endParaRPr lang="en-US"/>
+          </a:p>
+        </p:txBody>
+      </p:sp>
+      <p:cxnSp>
+        <p:nvCxnSpPr>
+          <p:cNvPr id="9" name="Elbow Connector 8"/>
+          <p:cNvCxnSpPr>
+            <a:stCxn id="27" idx="0"/>
+            <a:endCxn id="2" idx="0"/>
+          </p:cNvCxnSpPr>
+          <p:nvPr/>
+        </p:nvCxnSpPr>
+        <p:spPr>
+          <a:xfrm flipV="1">
+            <a:off x="5687457" y="568788"/>
+            <a:ext cx="658999" cy="554457"/>
+          </a:xfrm>
+          <a:prstGeom prst="bentConnector2">
+            <a:avLst/>
+          </a:prstGeom>
+        </p:spPr>
+        <p:style>
+          <a:lnRef idx="1">
+            <a:schemeClr val="dk1"/>
+          </a:lnRef>
+          <a:fillRef idx="0">
+            <a:schemeClr val="dk1"/>
+          </a:fillRef>
+          <a:effectRef idx="0">
+            <a:schemeClr val="dk1"/>
+          </a:effectRef>
+          <a:fontRef idx="minor">
+            <a:schemeClr val="tx1"/>
+          </a:fontRef>
+        </p:style>
+      </p:cxnSp>
+      <p:sp>
+        <p:nvSpPr>
+          <p:cNvPr id="36" name="Oval 35"/>
+          <p:cNvSpPr/>
+          <p:nvPr/>
+        </p:nvSpPr>
+        <p:spPr>
+          <a:xfrm>
+            <a:off x="6224536" y="1239733"/>
+            <a:ext cx="240792" cy="186071"/>
+          </a:xfrm>
+          <a:prstGeom prst="ellipse">
+            <a:avLst/>
+          </a:prstGeom>
+          <a:solidFill>
+            <a:schemeClr val="bg1"/>
+          </a:solidFill>
+          <a:ln>
+            <a:solidFill>
+              <a:schemeClr val="bg1"/>
+            </a:solidFill>
+          </a:ln>
+        </p:spPr>
+        <p:style>
+          <a:lnRef idx="2">
+            <a:schemeClr val="dk1"/>
+          </a:lnRef>
+          <a:fillRef idx="1">
+            <a:schemeClr val="lt1"/>
+          </a:fillRef>
+          <a:effectRef idx="0">
+            <a:schemeClr val="dk1"/>
+          </a:effectRef>
+          <a:fontRef idx="minor">
+            <a:schemeClr val="dk1"/>
+          </a:fontRef>
+        </p:style>
+        <p:txBody>
+          <a:bodyPr rtlCol="0" anchor="ctr"/>
+          <a:lstStyle/>
+          <a:p>
+            <a:pPr algn="ctr"/>
+            <a:endParaRPr lang="en-US"/>
+          </a:p>
+        </p:txBody>
+      </p:sp>
+      <p:cxnSp>
+        <p:nvCxnSpPr>
+          <p:cNvPr id="40" name="Elbow Connector 39"/>
+          <p:cNvCxnSpPr>
+            <a:stCxn id="36" idx="0"/>
+            <a:endCxn id="50" idx="0"/>
+          </p:cNvCxnSpPr>
+          <p:nvPr/>
+        </p:nvCxnSpPr>
+        <p:spPr>
+          <a:xfrm rot="16200000" flipH="1" flipV="1">
+            <a:off x="5663599" y="1678751"/>
+            <a:ext cx="1120352" cy="242315"/>
+          </a:xfrm>
+          <a:prstGeom prst="bentConnector3">
+            <a:avLst>
+              <a:gd name="adj1" fmla="val -5526"/>
+            </a:avLst>
+          </a:prstGeom>
+          <a:ln>
+            <a:tailEnd type="triangle"/>
+          </a:ln>
+        </p:spPr>
+        <p:style>
+          <a:lnRef idx="1">
+            <a:schemeClr val="dk1"/>
+          </a:lnRef>
+          <a:fillRef idx="0">
+            <a:schemeClr val="dk1"/>
+          </a:fillRef>
+          <a:effectRef idx="0">
+            <a:schemeClr val="dk1"/>
+          </a:effectRef>
+          <a:fontRef idx="minor">
+            <a:schemeClr val="tx1"/>
+          </a:fontRef>
+        </p:style>
+      </p:cxnSp>
+      <p:sp>
+        <p:nvSpPr>
+          <p:cNvPr id="56" name="Oval 55"/>
+          <p:cNvSpPr/>
+          <p:nvPr/>
+        </p:nvSpPr>
+        <p:spPr>
+          <a:xfrm>
+            <a:off x="3082746" y="3397029"/>
+            <a:ext cx="241300" cy="149225"/>
+          </a:xfrm>
+          <a:prstGeom prst="ellipse">
+            <a:avLst/>
+          </a:prstGeom>
+          <a:noFill/>
+          <a:ln>
+            <a:noFill/>
+          </a:ln>
+        </p:spPr>
+        <p:style>
+          <a:lnRef idx="2">
+            <a:schemeClr val="dk1"/>
+          </a:lnRef>
+          <a:fillRef idx="1">
+            <a:schemeClr val="lt1"/>
+          </a:fillRef>
+          <a:effectRef idx="0">
+            <a:schemeClr val="dk1"/>
+          </a:effectRef>
+          <a:fontRef idx="minor">
+            <a:schemeClr val="dk1"/>
+          </a:fontRef>
+        </p:style>
+        <p:txBody>
+          <a:bodyPr rtlCol="0" anchor="ctr"/>
+          <a:lstStyle/>
+          <a:p>
+            <a:pPr algn="ctr"/>
+            <a:endParaRPr lang="en-US"/>
+          </a:p>
+        </p:txBody>
+      </p:sp>
+      <p:sp>
+        <p:nvSpPr>
+          <p:cNvPr id="64" name="Oval 63"/>
+          <p:cNvSpPr/>
+          <p:nvPr/>
+        </p:nvSpPr>
+        <p:spPr>
+          <a:xfrm>
+            <a:off x="3097820" y="3386820"/>
+            <a:ext cx="211752" cy="169641"/>
+          </a:xfrm>
+          <a:prstGeom prst="ellipse">
+            <a:avLst/>
+          </a:prstGeom>
+          <a:noFill/>
+          <a:ln>
+            <a:noFill/>
+          </a:ln>
+        </p:spPr>
+        <p:style>
+          <a:lnRef idx="2">
+            <a:schemeClr val="dk1"/>
+          </a:lnRef>
+          <a:fillRef idx="1">
+            <a:schemeClr val="lt1"/>
+          </a:fillRef>
+          <a:effectRef idx="0">
+            <a:schemeClr val="dk1"/>
+          </a:effectRef>
+          <a:fontRef idx="minor">
+            <a:schemeClr val="dk1"/>
+          </a:fontRef>
+        </p:style>
+        <p:txBody>
+          <a:bodyPr rtlCol="0" anchor="ctr"/>
+          <a:lstStyle/>
+          <a:p>
+            <a:pPr algn="ctr"/>
+            <a:endParaRPr lang="en-US"/>
+          </a:p>
+        </p:txBody>
+      </p:sp>
+      <p:sp>
+        <p:nvSpPr>
+          <p:cNvPr id="97" name="Oval 96"/>
+          <p:cNvSpPr/>
+          <p:nvPr/>
+        </p:nvSpPr>
+        <p:spPr>
+          <a:xfrm>
+            <a:off x="3283522" y="2803303"/>
+            <a:ext cx="211752" cy="169641"/>
+          </a:xfrm>
+          <a:prstGeom prst="ellipse">
+            <a:avLst/>
+          </a:prstGeom>
+          <a:noFill/>
+          <a:ln>
+            <a:noFill/>
+          </a:ln>
+        </p:spPr>
+        <p:style>
+          <a:lnRef idx="2">
+            <a:schemeClr val="dk1"/>
+          </a:lnRef>
+          <a:fillRef idx="1">
+            <a:schemeClr val="lt1"/>
+          </a:fillRef>
+          <a:effectRef idx="0">
+            <a:schemeClr val="dk1"/>
+          </a:effectRef>
+          <a:fontRef idx="minor">
+            <a:schemeClr val="dk1"/>
+          </a:fontRef>
+        </p:style>
+        <p:txBody>
+          <a:bodyPr rtlCol="0" anchor="ctr"/>
+          <a:lstStyle/>
+          <a:p>
+            <a:pPr algn="ctr"/>
+            <a:endParaRPr lang="en-US"/>
+          </a:p>
+        </p:txBody>
+      </p:sp>
+      <p:sp>
+        <p:nvSpPr>
+          <p:cNvPr id="87" name="Freeform 86"/>
+          <p:cNvSpPr/>
+          <p:nvPr/>
+        </p:nvSpPr>
+        <p:spPr>
+          <a:xfrm>
+            <a:off x="3177540" y="2925126"/>
+            <a:ext cx="99060" cy="685800"/>
+          </a:xfrm>
+          <a:custGeom>
+            <a:avLst/>
+            <a:gdLst>
+              <a:gd name="connsiteX0" fmla="*/ 0 w 99060"/>
+              <a:gd name="connsiteY0" fmla="*/ 685800 h 685800"/>
+              <a:gd name="connsiteX1" fmla="*/ 0 w 99060"/>
+              <a:gd name="connsiteY1" fmla="*/ 449580 h 685800"/>
+              <a:gd name="connsiteX2" fmla="*/ 99060 w 99060"/>
+              <a:gd name="connsiteY2" fmla="*/ 0 h 685800"/>
+            </a:gdLst>
+            <a:ahLst/>
+            <a:cxnLst>
+              <a:cxn ang="0">
+                <a:pos x="connsiteX0" y="connsiteY0"/>
+              </a:cxn>
+              <a:cxn ang="0">
+                <a:pos x="connsiteX1" y="connsiteY1"/>
+              </a:cxn>
+              <a:cxn ang="0">
+                <a:pos x="connsiteX2" y="connsiteY2"/>
+              </a:cxn>
+            </a:cxnLst>
+            <a:rect l="l" t="t" r="r" b="b"/>
+            <a:pathLst>
+              <a:path w="99060" h="685800">
+                <a:moveTo>
+                  <a:pt x="0" y="685800"/>
+                </a:moveTo>
+                <a:lnTo>
+                  <a:pt x="0" y="449580"/>
+                </a:lnTo>
+                <a:lnTo>
+                  <a:pt x="99060" y="0"/>
+                </a:lnTo>
+              </a:path>
+            </a:pathLst>
+          </a:custGeom>
+          <a:noFill/>
+          <a:ln>
+            <a:tailEnd type="triangle"/>
+          </a:ln>
+        </p:spPr>
+        <p:style>
+          <a:lnRef idx="2">
+            <a:schemeClr val="dk1"/>
+          </a:lnRef>
+          <a:fillRef idx="1">
+            <a:schemeClr val="lt1"/>
+          </a:fillRef>
+          <a:effectRef idx="0">
+            <a:schemeClr val="dk1"/>
+          </a:effectRef>
+          <a:fontRef idx="minor">
+            <a:schemeClr val="dk1"/>
+          </a:fontRef>
+        </p:style>
+        <p:txBody>
+          <a:bodyPr rtlCol="0" anchor="ctr"/>
+          <a:lstStyle/>
+          <a:p>
+            <a:pPr algn="ctr"/>
+            <a:endParaRPr lang="en-US"/>
+          </a:p>
+        </p:txBody>
+      </p:sp>
+      <p:sp>
+        <p:nvSpPr>
+          <p:cNvPr id="72" name="Isosceles Triangle 71"/>
+          <p:cNvSpPr/>
+          <p:nvPr/>
+        </p:nvSpPr>
+        <p:spPr>
+          <a:xfrm rot="5400000">
+            <a:off x="3010126" y="2906511"/>
+            <a:ext cx="457200" cy="523835"/>
+          </a:xfrm>
+          <a:prstGeom prst="triangle">
+            <a:avLst/>
+          </a:prstGeom>
+        </p:spPr>
+        <p:style>
+          <a:lnRef idx="2">
+            <a:schemeClr val="dk1"/>
+          </a:lnRef>
+          <a:fillRef idx="1">
+            <a:schemeClr val="lt1"/>
+          </a:fillRef>
+          <a:effectRef idx="0">
+            <a:schemeClr val="dk1"/>
+          </a:effectRef>
+          <a:fontRef idx="minor">
+            <a:schemeClr val="dk1"/>
+          </a:fontRef>
+        </p:style>
+        <p:txBody>
+          <a:bodyPr vert="vert270" rtlCol="0" anchor="ctr"/>
+          <a:lstStyle/>
+          <a:p>
+            <a:pPr algn="ctr"/>
+            <a:r>
+              <a:rPr lang="en-US" sz="900" dirty="0" smtClean="0">
+                <a:latin typeface="Times New Roman" panose="02020603050405020304" pitchFamily="18" charset="0"/>
+                <a:cs typeface="Times New Roman" panose="02020603050405020304" pitchFamily="18" charset="0"/>
+              </a:rPr>
+              <a:t>α</a:t>
+            </a:r>
+            <a:r>
+              <a:rPr lang="en-US" sz="900" baseline="-25000" dirty="0" err="1" smtClean="0">
+                <a:latin typeface="Times New Roman" panose="02020603050405020304" pitchFamily="18" charset="0"/>
+                <a:cs typeface="Times New Roman" panose="02020603050405020304" pitchFamily="18" charset="0"/>
+              </a:rPr>
+              <a:t>j,m</a:t>
+            </a:r>
+            <a:endParaRPr lang="en-US" sz="900" baseline="-25000" dirty="0">
+              <a:latin typeface="Times New Roman" panose="02020603050405020304" pitchFamily="18" charset="0"/>
+              <a:cs typeface="Times New Roman" panose="02020603050405020304" pitchFamily="18" charset="0"/>
+            </a:endParaRPr>
+          </a:p>
+        </p:txBody>
+      </p:sp>
     </p:spTree>
     <p:extLst>
       <p:ext uri="{BB962C8B-B14F-4D97-AF65-F5344CB8AC3E}">

</xml_diff>

<commit_message>
Add block diagram to the paper
</commit_message>
<xml_diff>
--- a/JournalPaper/DPD BLock Diagram SIPS.pptx
+++ b/JournalPaper/DPD BLock Diagram SIPS.pptx
@@ -1,6 +1,6 @@
 
 <file path=ppt/presentation.xml><?xml version="1.0" encoding="utf-8"?>
-<p:presentation xmlns:a="http://schemas.openxmlformats.org/drawingml/2006/main" xmlns:r="http://schemas.openxmlformats.org/officeDocument/2006/relationships" xmlns:p="http://schemas.openxmlformats.org/presentationml/2006/main" saveSubsetFonts="1">
+<p:presentation xmlns:a="http://schemas.openxmlformats.org/drawingml/2006/main" xmlns:r="http://schemas.openxmlformats.org/officeDocument/2006/relationships" xmlns:p="http://schemas.openxmlformats.org/presentationml/2006/main" embedTrueTypeFonts="1" saveSubsetFonts="1">
   <p:sldMasterIdLst>
     <p:sldMasterId id="2147483660" r:id="rId1"/>
   </p:sldMasterIdLst>
@@ -9,6 +9,24 @@
   </p:sldIdLst>
   <p:sldSz cx="7772400" cy="10058400"/>
   <p:notesSz cx="6858000" cy="9144000"/>
+  <p:embeddedFontLst>
+    <p:embeddedFont>
+      <p:font typeface="Cambria Math" panose="02040503050406030204" pitchFamily="18" charset="0"/>
+      <p:regular r:id="rId3"/>
+    </p:embeddedFont>
+    <p:embeddedFont>
+      <p:font typeface="Calibri Light" panose="020F0302020204030204" pitchFamily="34" charset="0"/>
+      <p:regular r:id="rId4"/>
+      <p:italic r:id="rId5"/>
+    </p:embeddedFont>
+    <p:embeddedFont>
+      <p:font typeface="Calibri" panose="020F0502020204030204" pitchFamily="34" charset="0"/>
+      <p:regular r:id="rId6"/>
+      <p:bold r:id="rId7"/>
+      <p:italic r:id="rId8"/>
+      <p:boldItalic r:id="rId9"/>
+    </p:embeddedFont>
+  </p:embeddedFontLst>
   <p:defaultTextStyle>
     <a:defPPr>
       <a:defRPr lang="en-US"/>
@@ -3010,7 +3028,7 @@
           <a:lstStyle/>
           <a:p>
             <a:r>
-              <a:rPr lang="en-US" sz="1200" i="1" dirty="0" smtClean="0">
+              <a:rPr lang="en-US" sz="1200" dirty="0" smtClean="0">
                 <a:latin typeface="Times New Roman" panose="02020603050405020304" pitchFamily="18" charset="0"/>
                 <a:cs typeface="Times New Roman" panose="02020603050405020304" pitchFamily="18" charset="0"/>
               </a:rPr>
@@ -3019,14 +3037,21 @@
           </a:p>
           <a:p>
             <a:r>
+              <a:rPr lang="en-US" sz="1200" dirty="0" err="1" smtClean="0">
+                <a:latin typeface="Times New Roman" panose="02020603050405020304" pitchFamily="18" charset="0"/>
+                <a:cs typeface="Times New Roman" panose="02020603050405020304" pitchFamily="18" charset="0"/>
+              </a:rPr>
+              <a:t>IM</a:t>
+            </a:r>
+            <a:r>
               <a:rPr lang="en-US" sz="1200" i="1" dirty="0" err="1" smtClean="0">
                 <a:latin typeface="Times New Roman" panose="02020603050405020304" pitchFamily="18" charset="0"/>
                 <a:cs typeface="Times New Roman" panose="02020603050405020304" pitchFamily="18" charset="0"/>
               </a:rPr>
-              <a:t>IMi</a:t>
-            </a:r>
-            <a:r>
-              <a:rPr lang="en-US" sz="1200" i="1" dirty="0" smtClean="0">
+              <a:t>i</a:t>
+            </a:r>
+            <a:r>
+              <a:rPr lang="en-US" sz="1200" dirty="0" smtClean="0">
                 <a:latin typeface="Times New Roman" panose="02020603050405020304" pitchFamily="18" charset="0"/>
                 <a:cs typeface="Times New Roman" panose="02020603050405020304" pitchFamily="18" charset="0"/>
               </a:rPr>
@@ -3047,7 +3072,7 @@
               <a:t>th</a:t>
             </a:r>
             <a:r>
-              <a:rPr lang="en-US" sz="1200" i="1" dirty="0" smtClean="0">
+              <a:rPr lang="en-US" sz="1200" dirty="0" smtClean="0">
                 <a:latin typeface="Times New Roman" panose="02020603050405020304" pitchFamily="18" charset="0"/>
                 <a:cs typeface="Times New Roman" panose="02020603050405020304" pitchFamily="18" charset="0"/>
               </a:rPr>
@@ -3955,7 +3980,7 @@
           <a:p>
             <a:pPr algn="ctr"/>
             <a:r>
-              <a:rPr lang="en-US" sz="1200" i="1" dirty="0" smtClean="0">
+              <a:rPr lang="en-US" sz="1200" dirty="0" smtClean="0">
                 <a:latin typeface="Times New Roman" panose="02020603050405020304" pitchFamily="18" charset="0"/>
                 <a:cs typeface="Times New Roman" panose="02020603050405020304" pitchFamily="18" charset="0"/>
               </a:rPr>
@@ -3965,13 +3990,13 @@
           <a:p>
             <a:pPr algn="ctr"/>
             <a:r>
-              <a:rPr lang="en-US" sz="1200" i="1" dirty="0" smtClean="0">
+              <a:rPr lang="en-US" sz="1200" dirty="0" smtClean="0">
                 <a:latin typeface="Times New Roman" panose="02020603050405020304" pitchFamily="18" charset="0"/>
                 <a:cs typeface="Times New Roman" panose="02020603050405020304" pitchFamily="18" charset="0"/>
               </a:rPr>
               <a:t>and Orthogonalization</a:t>
             </a:r>
-            <a:endParaRPr lang="en-US" sz="1200" i="1" dirty="0">
+            <a:endParaRPr lang="en-US" sz="1200" dirty="0">
               <a:latin typeface="Times New Roman" panose="02020603050405020304" pitchFamily="18" charset="0"/>
               <a:cs typeface="Times New Roman" panose="02020603050405020304" pitchFamily="18" charset="0"/>
             </a:endParaRPr>
@@ -4012,7 +4037,7 @@
           <a:lstStyle/>
           <a:p>
             <a:r>
-              <a:rPr lang="en-US" sz="1200" i="1" dirty="0" smtClean="0">
+              <a:rPr lang="en-US" sz="1200" dirty="0" smtClean="0">
                 <a:latin typeface="Times New Roman" panose="02020603050405020304" pitchFamily="18" charset="0"/>
                 <a:cs typeface="Times New Roman" panose="02020603050405020304" pitchFamily="18" charset="0"/>
               </a:rPr>
@@ -4021,13 +4046,13 @@
           </a:p>
           <a:p>
             <a:r>
-              <a:rPr lang="en-US" sz="1200" i="1" dirty="0" smtClean="0">
+              <a:rPr lang="en-US" sz="1200" dirty="0" smtClean="0">
                 <a:latin typeface="Times New Roman" panose="02020603050405020304" pitchFamily="18" charset="0"/>
                 <a:cs typeface="Times New Roman" panose="02020603050405020304" pitchFamily="18" charset="0"/>
               </a:rPr>
               <a:t>and Interpolation</a:t>
             </a:r>
-            <a:endParaRPr lang="en-US" sz="1200" i="1" dirty="0">
+            <a:endParaRPr lang="en-US" sz="1200" dirty="0">
               <a:latin typeface="Times New Roman" panose="02020603050405020304" pitchFamily="18" charset="0"/>
               <a:cs typeface="Times New Roman" panose="02020603050405020304" pitchFamily="18" charset="0"/>
             </a:endParaRPr>
@@ -4338,34 +4363,48 @@
           <a:lstStyle/>
           <a:p>
             <a:r>
+              <a:rPr lang="en-US" sz="1050" dirty="0" smtClean="0">
+                <a:latin typeface="Times New Roman" panose="02020603050405020304" pitchFamily="18" charset="0"/>
+                <a:cs typeface="Times New Roman" panose="02020603050405020304" pitchFamily="18" charset="0"/>
+              </a:rPr>
+              <a:t>DPD Application Unit</a:t>
+            </a:r>
+          </a:p>
+          <a:p>
+            <a:r>
+              <a:rPr lang="en-US" sz="1050" dirty="0" err="1" smtClean="0">
+                <a:latin typeface="Times New Roman" panose="02020603050405020304" pitchFamily="18" charset="0"/>
+                <a:cs typeface="Times New Roman" panose="02020603050405020304" pitchFamily="18" charset="0"/>
+              </a:rPr>
+              <a:t>IM</a:t>
+            </a:r>
+            <a:r>
+              <a:rPr lang="en-US" sz="1050" i="1" dirty="0" err="1" smtClean="0">
+                <a:latin typeface="Times New Roman" panose="02020603050405020304" pitchFamily="18" charset="0"/>
+                <a:cs typeface="Times New Roman" panose="02020603050405020304" pitchFamily="18" charset="0"/>
+              </a:rPr>
+              <a:t>j</a:t>
+            </a:r>
+            <a:r>
+              <a:rPr lang="en-US" sz="1050" dirty="0">
+                <a:latin typeface="Times New Roman" panose="02020603050405020304" pitchFamily="18" charset="0"/>
+                <a:cs typeface="Times New Roman" panose="02020603050405020304" pitchFamily="18" charset="0"/>
+              </a:rPr>
+              <a:t>;</a:t>
+            </a:r>
+            <a:r>
+              <a:rPr lang="en-US" sz="1050" dirty="0" smtClean="0">
+                <a:latin typeface="Times New Roman" panose="02020603050405020304" pitchFamily="18" charset="0"/>
+                <a:cs typeface="Times New Roman" panose="02020603050405020304" pitchFamily="18" charset="0"/>
+              </a:rPr>
+              <a:t> </a:t>
+            </a:r>
+            <a:r>
               <a:rPr lang="en-US" sz="1050" i="1" dirty="0" smtClean="0">
                 <a:latin typeface="Times New Roman" panose="02020603050405020304" pitchFamily="18" charset="0"/>
                 <a:cs typeface="Times New Roman" panose="02020603050405020304" pitchFamily="18" charset="0"/>
               </a:rPr>
-              <a:t>DPD Application Unit</a:t>
-            </a:r>
-          </a:p>
-          <a:p>
-            <a:r>
-              <a:rPr lang="en-US" sz="1050" i="1" dirty="0" err="1" smtClean="0">
-                <a:latin typeface="Times New Roman" panose="02020603050405020304" pitchFamily="18" charset="0"/>
-                <a:cs typeface="Times New Roman" panose="02020603050405020304" pitchFamily="18" charset="0"/>
-              </a:rPr>
-              <a:t>IMj</a:t>
-            </a:r>
-            <a:r>
-              <a:rPr lang="en-US" sz="1050" i="1" dirty="0">
-                <a:latin typeface="Times New Roman" panose="02020603050405020304" pitchFamily="18" charset="0"/>
-                <a:cs typeface="Times New Roman" panose="02020603050405020304" pitchFamily="18" charset="0"/>
-              </a:rPr>
-              <a:t>;</a:t>
-            </a:r>
-            <a:r>
-              <a:rPr lang="en-US" sz="1050" i="1" dirty="0" smtClean="0">
-                <a:latin typeface="Times New Roman" panose="02020603050405020304" pitchFamily="18" charset="0"/>
-                <a:cs typeface="Times New Roman" panose="02020603050405020304" pitchFamily="18" charset="0"/>
-              </a:rPr>
-              <a:t> n</a:t>
+              <a:t>n</a:t>
             </a:r>
             <a:r>
               <a:rPr lang="en-US" sz="1050" i="1" baseline="-25000" dirty="0" smtClean="0">
@@ -4375,13 +4414,13 @@
               <a:t>th</a:t>
             </a:r>
             <a:r>
-              <a:rPr lang="en-US" sz="1050" i="1" dirty="0" smtClean="0">
+              <a:rPr lang="en-US" sz="1050" dirty="0" smtClean="0">
                 <a:latin typeface="Times New Roman" panose="02020603050405020304" pitchFamily="18" charset="0"/>
                 <a:cs typeface="Times New Roman" panose="02020603050405020304" pitchFamily="18" charset="0"/>
               </a:rPr>
               <a:t> order</a:t>
             </a:r>
-            <a:endParaRPr lang="en-US" sz="1050" i="1" dirty="0">
+            <a:endParaRPr lang="en-US" sz="1050" dirty="0">
               <a:latin typeface="Times New Roman" panose="02020603050405020304" pitchFamily="18" charset="0"/>
               <a:cs typeface="Times New Roman" panose="02020603050405020304" pitchFamily="18" charset="0"/>
             </a:endParaRPr>
@@ -4821,14 +4860,12 @@
       <p:cxnSp>
         <p:nvCxnSpPr>
           <p:cNvPr id="130" name="Straight Arrow Connector 129"/>
-          <p:cNvCxnSpPr>
-            <a:endCxn id="83" idx="3"/>
-          </p:cNvCxnSpPr>
+          <p:cNvCxnSpPr/>
           <p:nvPr/>
         </p:nvCxnSpPr>
         <p:spPr>
           <a:xfrm flipH="1" flipV="1">
-            <a:off x="4784248" y="2290141"/>
+            <a:off x="4814728" y="2290141"/>
             <a:ext cx="265570" cy="0"/>
           </a:xfrm>
           <a:prstGeom prst="straightConnector1">
@@ -5544,6 +5581,334 @@
               <a:t>j,m</a:t>
             </a:r>
             <a:endParaRPr lang="en-US" sz="900" baseline="-25000" dirty="0">
+              <a:latin typeface="Times New Roman" panose="02020603050405020304" pitchFamily="18" charset="0"/>
+              <a:cs typeface="Times New Roman" panose="02020603050405020304" pitchFamily="18" charset="0"/>
+            </a:endParaRPr>
+          </a:p>
+        </p:txBody>
+      </p:sp>
+      <p:sp>
+        <p:nvSpPr>
+          <p:cNvPr id="63" name="TextBox 62"/>
+          <p:cNvSpPr txBox="1"/>
+          <p:nvPr/>
+        </p:nvSpPr>
+        <p:spPr>
+          <a:xfrm>
+            <a:off x="1633173" y="3563658"/>
+            <a:ext cx="451050" cy="268984"/>
+          </a:xfrm>
+          <a:prstGeom prst="rect">
+            <a:avLst/>
+          </a:prstGeom>
+          <a:noFill/>
+        </p:spPr>
+        <p:txBody>
+          <a:bodyPr wrap="square" rtlCol="0">
+            <a:spAutoFit/>
+          </a:bodyPr>
+          <a:lstStyle/>
+          <a:p>
+            <a:pPr algn="ctr"/>
+            <a:r>
+              <a:rPr lang="en-US" sz="1148" i="1" dirty="0" err="1" smtClean="0">
+                <a:latin typeface="Times New Roman" panose="02020603050405020304" pitchFamily="18" charset="0"/>
+                <a:cs typeface="Times New Roman" panose="02020603050405020304" pitchFamily="18" charset="0"/>
+              </a:rPr>
+              <a:t>u</a:t>
+            </a:r>
+            <a:r>
+              <a:rPr lang="en-US" sz="1148" i="1" baseline="-25000" dirty="0" err="1" smtClean="0">
+                <a:latin typeface="Times New Roman" panose="02020603050405020304" pitchFamily="18" charset="0"/>
+                <a:cs typeface="Times New Roman" panose="02020603050405020304" pitchFamily="18" charset="0"/>
+              </a:rPr>
+              <a:t>m</a:t>
+            </a:r>
+            <a:r>
+              <a:rPr lang="en-US" sz="1148" i="1" baseline="30000" dirty="0" err="1" smtClean="0">
+                <a:latin typeface="Times New Roman" panose="02020603050405020304" pitchFamily="18" charset="0"/>
+                <a:cs typeface="Times New Roman" panose="02020603050405020304" pitchFamily="18" charset="0"/>
+              </a:rPr>
+              <a:t>i</a:t>
+            </a:r>
+            <a:endParaRPr lang="en-US" sz="1148" i="1" baseline="30000" dirty="0">
+              <a:latin typeface="Times New Roman" panose="02020603050405020304" pitchFamily="18" charset="0"/>
+              <a:cs typeface="Times New Roman" panose="02020603050405020304" pitchFamily="18" charset="0"/>
+            </a:endParaRPr>
+          </a:p>
+        </p:txBody>
+      </p:sp>
+      <p:sp>
+        <p:nvSpPr>
+          <p:cNvPr id="65" name="TextBox 64"/>
+          <p:cNvSpPr txBox="1"/>
+          <p:nvPr/>
+        </p:nvSpPr>
+        <p:spPr>
+          <a:xfrm>
+            <a:off x="1633173" y="2296155"/>
+            <a:ext cx="451050" cy="268984"/>
+          </a:xfrm>
+          <a:prstGeom prst="rect">
+            <a:avLst/>
+          </a:prstGeom>
+          <a:noFill/>
+        </p:spPr>
+        <p:txBody>
+          <a:bodyPr wrap="square" rtlCol="0">
+            <a:spAutoFit/>
+          </a:bodyPr>
+          <a:lstStyle/>
+          <a:p>
+            <a:pPr algn="ctr"/>
+            <a:r>
+              <a:rPr lang="en-US" sz="1148" i="1" dirty="0" err="1" smtClean="0">
+                <a:latin typeface="Times New Roman" panose="02020603050405020304" pitchFamily="18" charset="0"/>
+                <a:cs typeface="Times New Roman" panose="02020603050405020304" pitchFamily="18" charset="0"/>
+              </a:rPr>
+              <a:t>u</a:t>
+            </a:r>
+            <a:r>
+              <a:rPr lang="en-US" sz="1148" i="1" baseline="-25000" dirty="0" err="1" smtClean="0">
+                <a:latin typeface="Times New Roman" panose="02020603050405020304" pitchFamily="18" charset="0"/>
+                <a:cs typeface="Times New Roman" panose="02020603050405020304" pitchFamily="18" charset="0"/>
+              </a:rPr>
+              <a:t>n</a:t>
+            </a:r>
+            <a:r>
+              <a:rPr lang="en-US" sz="1148" i="1" baseline="30000" dirty="0" err="1">
+                <a:latin typeface="Times New Roman" panose="02020603050405020304" pitchFamily="18" charset="0"/>
+                <a:cs typeface="Times New Roman" panose="02020603050405020304" pitchFamily="18" charset="0"/>
+              </a:rPr>
+              <a:t>j</a:t>
+            </a:r>
+            <a:endParaRPr lang="en-US" sz="1148" i="1" baseline="30000" dirty="0">
+              <a:latin typeface="Times New Roman" panose="02020603050405020304" pitchFamily="18" charset="0"/>
+              <a:cs typeface="Times New Roman" panose="02020603050405020304" pitchFamily="18" charset="0"/>
+            </a:endParaRPr>
+          </a:p>
+        </p:txBody>
+      </p:sp>
+      <p:sp>
+        <p:nvSpPr>
+          <p:cNvPr id="66" name="TextBox 65"/>
+          <p:cNvSpPr txBox="1"/>
+          <p:nvPr/>
+        </p:nvSpPr>
+        <p:spPr>
+          <a:xfrm>
+            <a:off x="3179046" y="878041"/>
+            <a:ext cx="451050" cy="268984"/>
+          </a:xfrm>
+          <a:prstGeom prst="rect">
+            <a:avLst/>
+          </a:prstGeom>
+          <a:noFill/>
+        </p:spPr>
+        <p:txBody>
+          <a:bodyPr wrap="square" rtlCol="0">
+            <a:spAutoFit/>
+          </a:bodyPr>
+          <a:lstStyle/>
+          <a:p>
+            <a:pPr algn="ctr"/>
+            <a:r>
+              <a:rPr lang="en-US" sz="1148" i="1" dirty="0" smtClean="0">
+                <a:latin typeface="Times New Roman" panose="02020603050405020304" pitchFamily="18" charset="0"/>
+                <a:cs typeface="Times New Roman" panose="02020603050405020304" pitchFamily="18" charset="0"/>
+              </a:rPr>
+              <a:t>x</a:t>
+            </a:r>
+            <a:endParaRPr lang="en-US" sz="1148" i="1" baseline="30000" dirty="0">
+              <a:latin typeface="Times New Roman" panose="02020603050405020304" pitchFamily="18" charset="0"/>
+              <a:cs typeface="Times New Roman" panose="02020603050405020304" pitchFamily="18" charset="0"/>
+            </a:endParaRPr>
+          </a:p>
+        </p:txBody>
+      </p:sp>
+      <mc:AlternateContent xmlns:mc="http://schemas.openxmlformats.org/markup-compatibility/2006">
+        <mc:Choice xmlns:a14="http://schemas.microsoft.com/office/drawing/2010/main" Requires="a14">
+          <p:sp>
+            <p:nvSpPr>
+              <p:cNvPr id="67" name="TextBox 66"/>
+              <p:cNvSpPr txBox="1"/>
+              <p:nvPr/>
+            </p:nvSpPr>
+            <p:spPr>
+              <a:xfrm>
+                <a:off x="3868970" y="878041"/>
+                <a:ext cx="451050" cy="268984"/>
+              </a:xfrm>
+              <a:prstGeom prst="rect">
+                <a:avLst/>
+              </a:prstGeom>
+              <a:noFill/>
+            </p:spPr>
+            <p:txBody>
+              <a:bodyPr wrap="square" rtlCol="0">
+                <a:spAutoFit/>
+              </a:bodyPr>
+              <a:lstStyle/>
+              <a:p>
+                <a:pPr algn="ctr"/>
+                <a14:m>
+                  <m:oMathPara xmlns:m="http://schemas.openxmlformats.org/officeDocument/2006/math">
+                    <m:oMathParaPr>
+                      <m:jc m:val="centerGroup"/>
+                    </m:oMathParaPr>
+                    <m:oMath xmlns:m="http://schemas.openxmlformats.org/officeDocument/2006/math">
+                      <m:acc>
+                        <m:accPr>
+                          <m:chr m:val="̃"/>
+                          <m:ctrlPr>
+                            <a:rPr lang="en-US" sz="1148" i="1" smtClean="0">
+                              <a:latin typeface="Cambria Math" panose="02040503050406030204" pitchFamily="18" charset="0"/>
+                              <a:cs typeface="Times New Roman" panose="02020603050405020304" pitchFamily="18" charset="0"/>
+                            </a:rPr>
+                          </m:ctrlPr>
+                        </m:accPr>
+                        <m:e>
+                          <m:r>
+                            <a:rPr lang="en-US" sz="1148" b="0" i="1" smtClean="0">
+                              <a:latin typeface="Cambria Math" panose="02040503050406030204" pitchFamily="18" charset="0"/>
+                              <a:cs typeface="Times New Roman" panose="02020603050405020304" pitchFamily="18" charset="0"/>
+                            </a:rPr>
+                            <m:t>𝑥</m:t>
+                          </m:r>
+                        </m:e>
+                      </m:acc>
+                    </m:oMath>
+                  </m:oMathPara>
+                </a14:m>
+                <a:endParaRPr lang="en-US" sz="1148" i="1" dirty="0">
+                  <a:latin typeface="Times New Roman" panose="02020603050405020304" pitchFamily="18" charset="0"/>
+                  <a:cs typeface="Times New Roman" panose="02020603050405020304" pitchFamily="18" charset="0"/>
+                </a:endParaRPr>
+              </a:p>
+            </p:txBody>
+          </p:sp>
+        </mc:Choice>
+        <mc:Fallback>
+          <p:sp>
+            <p:nvSpPr>
+              <p:cNvPr id="67" name="TextBox 66"/>
+              <p:cNvSpPr txBox="1">
+                <a:spLocks noRot="1" noChangeAspect="1" noMove="1" noResize="1" noEditPoints="1" noAdjustHandles="1" noChangeArrowheads="1" noChangeShapeType="1" noTextEdit="1"/>
+              </p:cNvSpPr>
+              <p:nvPr/>
+            </p:nvSpPr>
+            <p:spPr>
+              <a:xfrm>
+                <a:off x="3868970" y="878041"/>
+                <a:ext cx="451050" cy="268984"/>
+              </a:xfrm>
+              <a:prstGeom prst="rect">
+                <a:avLst/>
+              </a:prstGeom>
+              <a:blipFill>
+                <a:blip r:embed="rId2"/>
+                <a:stretch>
+                  <a:fillRect/>
+                </a:stretch>
+              </a:blipFill>
+            </p:spPr>
+            <p:txBody>
+              <a:bodyPr/>
+              <a:lstStyle/>
+              <a:p>
+                <a:r>
+                  <a:rPr lang="en-US">
+                    <a:noFill/>
+                  </a:rPr>
+                  <a:t> </a:t>
+                </a:r>
+              </a:p>
+            </p:txBody>
+          </p:sp>
+        </mc:Fallback>
+      </mc:AlternateContent>
+      <p:sp>
+        <p:nvSpPr>
+          <p:cNvPr id="68" name="TextBox 67"/>
+          <p:cNvSpPr txBox="1"/>
+          <p:nvPr/>
+        </p:nvSpPr>
+        <p:spPr>
+          <a:xfrm>
+            <a:off x="5571587" y="896007"/>
+            <a:ext cx="451050" cy="268984"/>
+          </a:xfrm>
+          <a:prstGeom prst="rect">
+            <a:avLst/>
+          </a:prstGeom>
+          <a:noFill/>
+        </p:spPr>
+        <p:txBody>
+          <a:bodyPr wrap="square" rtlCol="0">
+            <a:spAutoFit/>
+          </a:bodyPr>
+          <a:lstStyle/>
+          <a:p>
+            <a:pPr algn="ctr"/>
+            <a:r>
+              <a:rPr lang="en-US" sz="1148" i="1" dirty="0" smtClean="0">
+                <a:latin typeface="Times New Roman" panose="02020603050405020304" pitchFamily="18" charset="0"/>
+                <a:cs typeface="Times New Roman" panose="02020603050405020304" pitchFamily="18" charset="0"/>
+              </a:rPr>
+              <a:t>y</a:t>
+            </a:r>
+            <a:endParaRPr lang="en-US" sz="1148" i="1" baseline="30000" dirty="0">
+              <a:latin typeface="Times New Roman" panose="02020603050405020304" pitchFamily="18" charset="0"/>
+              <a:cs typeface="Times New Roman" panose="02020603050405020304" pitchFamily="18" charset="0"/>
+            </a:endParaRPr>
+          </a:p>
+        </p:txBody>
+      </p:sp>
+      <p:sp>
+        <p:nvSpPr>
+          <p:cNvPr id="71" name="TextBox 70"/>
+          <p:cNvSpPr txBox="1"/>
+          <p:nvPr/>
+        </p:nvSpPr>
+        <p:spPr>
+          <a:xfrm>
+            <a:off x="3497805" y="3563658"/>
+            <a:ext cx="451050" cy="386773"/>
+          </a:xfrm>
+          <a:prstGeom prst="rect">
+            <a:avLst/>
+          </a:prstGeom>
+          <a:noFill/>
+        </p:spPr>
+        <p:txBody>
+          <a:bodyPr wrap="square" rtlCol="0">
+            <a:spAutoFit/>
+          </a:bodyPr>
+          <a:lstStyle/>
+          <a:p>
+            <a:pPr algn="ctr"/>
+            <a:r>
+              <a:rPr lang="en-US" sz="1148" i="1" dirty="0" err="1" smtClean="0">
+                <a:latin typeface="Times New Roman" panose="02020603050405020304" pitchFamily="18" charset="0"/>
+                <a:cs typeface="Times New Roman" panose="02020603050405020304" pitchFamily="18" charset="0"/>
+              </a:rPr>
+              <a:t>e</a:t>
+            </a:r>
+            <a:r>
+              <a:rPr lang="en-US" sz="1148" i="1" baseline="-25000" dirty="0" err="1" smtClean="0">
+                <a:latin typeface="Times New Roman" panose="02020603050405020304" pitchFamily="18" charset="0"/>
+                <a:cs typeface="Times New Roman" panose="02020603050405020304" pitchFamily="18" charset="0"/>
+              </a:rPr>
+              <a:t>IMi</a:t>
+            </a:r>
+            <a:endParaRPr lang="en-US" sz="1148" i="1" baseline="-25000" dirty="0">
+              <a:latin typeface="Times New Roman" panose="02020603050405020304" pitchFamily="18" charset="0"/>
+              <a:cs typeface="Times New Roman" panose="02020603050405020304" pitchFamily="18" charset="0"/>
+            </a:endParaRPr>
+          </a:p>
+          <a:p>
+            <a:pPr algn="ctr"/>
+            <a:endParaRPr lang="en-US" sz="1148" i="1" baseline="-25000" dirty="0">
               <a:latin typeface="Times New Roman" panose="02020603050405020304" pitchFamily="18" charset="0"/>
               <a:cs typeface="Times New Roman" panose="02020603050405020304" pitchFamily="18" charset="0"/>
             </a:endParaRPr>

</xml_diff>